<commit_message>
updated activity 1 ppt
</commit_message>
<xml_diff>
--- a/static/activities/activity-1.pptx
+++ b/static/activities/activity-1.pptx
@@ -6,7 +6,7 @@
     <p:sldMasterId id="2147483672" r:id="rId2"/>
   </p:sldMasterIdLst>
   <p:notesMasterIdLst>
-    <p:notesMasterId r:id="rId11"/>
+    <p:notesMasterId r:id="rId16"/>
   </p:notesMasterIdLst>
   <p:sldIdLst>
     <p:sldId id="256" r:id="rId3"/>
@@ -17,6 +17,11 @@
     <p:sldId id="287" r:id="rId8"/>
     <p:sldId id="288" r:id="rId9"/>
     <p:sldId id="289" r:id="rId10"/>
+    <p:sldId id="290" r:id="rId11"/>
+    <p:sldId id="291" r:id="rId12"/>
+    <p:sldId id="292" r:id="rId13"/>
+    <p:sldId id="293" r:id="rId14"/>
+    <p:sldId id="294" r:id="rId15"/>
   </p:sldIdLst>
   <p:sldSz cx="12192000" cy="6858000"/>
   <p:notesSz cx="6858000" cy="9144000"/>
@@ -216,7 +221,7 @@
           <a:p>
             <a:fld id="{ACAF237C-D3AC-41D9-872D-7B8917C75021}" type="datetimeFigureOut">
               <a:rPr lang="en-US" smtClean="0"/>
-              <a:t>11/5/2019</a:t>
+              <a:t>11/14/2019</a:t>
             </a:fld>
             <a:endParaRPr lang="en-US"/>
           </a:p>
@@ -1288,7 +1293,7 @@
           <a:p>
             <a:fld id="{F5373CDE-B1F8-4669-A974-97C527BD67AE}" type="datetimeFigureOut">
               <a:rPr lang="en-US" smtClean="0"/>
-              <a:t>11/5/2019</a:t>
+              <a:t>11/14/2019</a:t>
             </a:fld>
             <a:endParaRPr lang="en-US"/>
           </a:p>
@@ -1512,7 +1517,7 @@
           <a:p>
             <a:fld id="{F5373CDE-B1F8-4669-A974-97C527BD67AE}" type="datetimeFigureOut">
               <a:rPr lang="en-US" smtClean="0"/>
-              <a:t>11/5/2019</a:t>
+              <a:t>11/14/2019</a:t>
             </a:fld>
             <a:endParaRPr lang="en-US"/>
           </a:p>
@@ -1772,7 +1777,7 @@
           <a:p>
             <a:fld id="{589E5873-CF7F-45F3-B283-E59B1D6F242C}" type="datetimeFigureOut">
               <a:rPr lang="en-US" smtClean="0"/>
-              <a:t>11/5/2019</a:t>
+              <a:t>11/14/2019</a:t>
             </a:fld>
             <a:endParaRPr lang="en-US"/>
           </a:p>
@@ -1940,7 +1945,7 @@
           <a:p>
             <a:fld id="{589E5873-CF7F-45F3-B283-E59B1D6F242C}" type="datetimeFigureOut">
               <a:rPr lang="en-US" smtClean="0"/>
-              <a:t>11/5/2019</a:t>
+              <a:t>11/14/2019</a:t>
             </a:fld>
             <a:endParaRPr lang="en-US"/>
           </a:p>
@@ -2185,7 +2190,7 @@
           <a:p>
             <a:fld id="{589E5873-CF7F-45F3-B283-E59B1D6F242C}" type="datetimeFigureOut">
               <a:rPr lang="en-US" smtClean="0"/>
-              <a:t>11/5/2019</a:t>
+              <a:t>11/14/2019</a:t>
             </a:fld>
             <a:endParaRPr lang="en-US"/>
           </a:p>
@@ -2470,7 +2475,7 @@
           <a:p>
             <a:fld id="{589E5873-CF7F-45F3-B283-E59B1D6F242C}" type="datetimeFigureOut">
               <a:rPr lang="en-US" smtClean="0"/>
-              <a:t>11/5/2019</a:t>
+              <a:t>11/14/2019</a:t>
             </a:fld>
             <a:endParaRPr lang="en-US"/>
           </a:p>
@@ -2889,7 +2894,7 @@
           <a:p>
             <a:fld id="{589E5873-CF7F-45F3-B283-E59B1D6F242C}" type="datetimeFigureOut">
               <a:rPr lang="en-US" smtClean="0"/>
-              <a:t>11/5/2019</a:t>
+              <a:t>11/14/2019</a:t>
             </a:fld>
             <a:endParaRPr lang="en-US"/>
           </a:p>
@@ -3006,7 +3011,7 @@
           <a:p>
             <a:fld id="{589E5873-CF7F-45F3-B283-E59B1D6F242C}" type="datetimeFigureOut">
               <a:rPr lang="en-US" smtClean="0"/>
-              <a:t>11/5/2019</a:t>
+              <a:t>11/14/2019</a:t>
             </a:fld>
             <a:endParaRPr lang="en-US"/>
           </a:p>
@@ -3101,7 +3106,7 @@
           <a:p>
             <a:fld id="{589E5873-CF7F-45F3-B283-E59B1D6F242C}" type="datetimeFigureOut">
               <a:rPr lang="en-US" smtClean="0"/>
-              <a:t>11/5/2019</a:t>
+              <a:t>11/14/2019</a:t>
             </a:fld>
             <a:endParaRPr lang="en-US"/>
           </a:p>
@@ -3376,7 +3381,7 @@
           <a:p>
             <a:fld id="{589E5873-CF7F-45F3-B283-E59B1D6F242C}" type="datetimeFigureOut">
               <a:rPr lang="en-US" smtClean="0"/>
-              <a:t>11/5/2019</a:t>
+              <a:t>11/14/2019</a:t>
             </a:fld>
             <a:endParaRPr lang="en-US"/>
           </a:p>
@@ -3877,7 +3882,7 @@
           <a:p>
             <a:fld id="{589E5873-CF7F-45F3-B283-E59B1D6F242C}" type="datetimeFigureOut">
               <a:rPr lang="en-US" smtClean="0"/>
-              <a:t>11/5/2019</a:t>
+              <a:t>11/14/2019</a:t>
             </a:fld>
             <a:endParaRPr lang="en-US"/>
           </a:p>
@@ -4045,7 +4050,7 @@
           <a:p>
             <a:fld id="{589E5873-CF7F-45F3-B283-E59B1D6F242C}" type="datetimeFigureOut">
               <a:rPr lang="en-US" smtClean="0"/>
-              <a:t>11/5/2019</a:t>
+              <a:t>11/14/2019</a:t>
             </a:fld>
             <a:endParaRPr lang="en-US"/>
           </a:p>
@@ -4223,7 +4228,7 @@
           <a:p>
             <a:fld id="{589E5873-CF7F-45F3-B283-E59B1D6F242C}" type="datetimeFigureOut">
               <a:rPr lang="en-US" smtClean="0"/>
-              <a:t>11/5/2019</a:t>
+              <a:t>11/14/2019</a:t>
             </a:fld>
             <a:endParaRPr lang="en-US"/>
           </a:p>
@@ -4494,7 +4499,7 @@
           <a:p>
             <a:fld id="{F5373CDE-B1F8-4669-A974-97C527BD67AE}" type="datetimeFigureOut">
               <a:rPr lang="en-US" smtClean="0"/>
-              <a:t>11/5/2019</a:t>
+              <a:t>11/14/2019</a:t>
             </a:fld>
             <a:endParaRPr lang="en-US"/>
           </a:p>
@@ -4775,7 +4780,7 @@
           <a:p>
             <a:fld id="{F5373CDE-B1F8-4669-A974-97C527BD67AE}" type="datetimeFigureOut">
               <a:rPr lang="en-US" smtClean="0"/>
-              <a:t>11/5/2019</a:t>
+              <a:t>11/14/2019</a:t>
             </a:fld>
             <a:endParaRPr lang="en-US"/>
           </a:p>
@@ -5203,7 +5208,7 @@
           <a:p>
             <a:fld id="{F5373CDE-B1F8-4669-A974-97C527BD67AE}" type="datetimeFigureOut">
               <a:rPr lang="en-US" smtClean="0"/>
-              <a:t>11/5/2019</a:t>
+              <a:t>11/14/2019</a:t>
             </a:fld>
             <a:endParaRPr lang="en-US"/>
           </a:p>
@@ -5360,7 +5365,7 @@
           <a:p>
             <a:fld id="{F5373CDE-B1F8-4669-A974-97C527BD67AE}" type="datetimeFigureOut">
               <a:rPr lang="en-US" smtClean="0"/>
-              <a:t>11/5/2019</a:t>
+              <a:t>11/14/2019</a:t>
             </a:fld>
             <a:endParaRPr lang="en-US"/>
           </a:p>
@@ -5489,7 +5494,7 @@
           <a:p>
             <a:fld id="{F5373CDE-B1F8-4669-A974-97C527BD67AE}" type="datetimeFigureOut">
               <a:rPr lang="en-US" smtClean="0"/>
-              <a:t>11/5/2019</a:t>
+              <a:t>11/14/2019</a:t>
             </a:fld>
             <a:endParaRPr lang="en-US"/>
           </a:p>
@@ -5816,7 +5821,7 @@
           <a:p>
             <a:fld id="{F5373CDE-B1F8-4669-A974-97C527BD67AE}" type="datetimeFigureOut">
               <a:rPr lang="en-US" smtClean="0"/>
-              <a:t>11/5/2019</a:t>
+              <a:t>11/14/2019</a:t>
             </a:fld>
             <a:endParaRPr lang="en-US"/>
           </a:p>
@@ -6123,7 +6128,7 @@
           <a:p>
             <a:fld id="{F5373CDE-B1F8-4669-A974-97C527BD67AE}" type="datetimeFigureOut">
               <a:rPr lang="en-US" smtClean="0"/>
-              <a:t>11/5/2019</a:t>
+              <a:t>11/14/2019</a:t>
             </a:fld>
             <a:endParaRPr lang="en-US"/>
           </a:p>
@@ -6921,7 +6926,7 @@
           <a:p>
             <a:fld id="{589E5873-CF7F-45F3-B283-E59B1D6F242C}" type="datetimeFigureOut">
               <a:rPr lang="en-US" smtClean="0"/>
-              <a:t>11/5/2019</a:t>
+              <a:t>11/14/2019</a:t>
             </a:fld>
             <a:endParaRPr lang="en-US"/>
           </a:p>
@@ -7355,6 +7360,749 @@
     <p:extLst>
       <p:ext uri="{BB962C8B-B14F-4D97-AF65-F5344CB8AC3E}">
         <p14:creationId xmlns:p14="http://schemas.microsoft.com/office/powerpoint/2010/main" val="1689980570"/>
+      </p:ext>
+    </p:extLst>
+  </p:cSld>
+  <p:clrMapOvr>
+    <a:masterClrMapping/>
+  </p:clrMapOvr>
+</p:sld>
+</file>
+
+<file path=ppt/slides/slide10.xml><?xml version="1.0" encoding="utf-8"?>
+<p:sld xmlns:a="http://schemas.openxmlformats.org/drawingml/2006/main" xmlns:r="http://schemas.openxmlformats.org/officeDocument/2006/relationships" xmlns:p="http://schemas.openxmlformats.org/presentationml/2006/main">
+  <p:cSld>
+    <p:spTree>
+      <p:nvGrpSpPr>
+        <p:cNvPr id="1" name=""/>
+        <p:cNvGrpSpPr/>
+        <p:nvPr/>
+      </p:nvGrpSpPr>
+      <p:grpSpPr>
+        <a:xfrm>
+          <a:off x="0" y="0"/>
+          <a:ext cx="0" cy="0"/>
+          <a:chOff x="0" y="0"/>
+          <a:chExt cx="0" cy="0"/>
+        </a:xfrm>
+      </p:grpSpPr>
+      <p:graphicFrame>
+        <p:nvGraphicFramePr>
+          <p:cNvPr id="4" name="Table 3">
+            <a:extLst>
+              <a:ext uri="{FF2B5EF4-FFF2-40B4-BE49-F238E27FC236}">
+                <a16:creationId xmlns:a16="http://schemas.microsoft.com/office/drawing/2014/main" id="{6343D222-0039-47CD-9DD7-CCF6A72D21AB}"/>
+              </a:ext>
+            </a:extLst>
+          </p:cNvPr>
+          <p:cNvGraphicFramePr>
+            <a:graphicFrameLocks noGrp="1"/>
+          </p:cNvGraphicFramePr>
+          <p:nvPr>
+            <p:extLst>
+              <p:ext uri="{D42A27DB-BD31-4B8C-83A1-F6EECF244321}">
+                <p14:modId xmlns:p14="http://schemas.microsoft.com/office/powerpoint/2010/main" val="1925960934"/>
+              </p:ext>
+            </p:extLst>
+          </p:nvPr>
+        </p:nvGraphicFramePr>
+        <p:xfrm>
+          <a:off x="414528" y="73490"/>
+          <a:ext cx="11375136" cy="5896808"/>
+        </p:xfrm>
+        <a:graphic>
+          <a:graphicData uri="http://schemas.openxmlformats.org/drawingml/2006/table">
+            <a:tbl>
+              <a:tblPr firstRow="1" bandRow="1">
+                <a:tableStyleId>{5940675A-B579-460E-94D1-54222C63F5DA}</a:tableStyleId>
+              </a:tblPr>
+              <a:tblGrid>
+                <a:gridCol w="5687568">
+                  <a:extLst>
+                    <a:ext uri="{9D8B030D-6E8A-4147-A177-3AD203B41FA5}">
+                      <a16:colId xmlns:a16="http://schemas.microsoft.com/office/drawing/2014/main" val="417726302"/>
+                    </a:ext>
+                  </a:extLst>
+                </a:gridCol>
+                <a:gridCol w="5687568">
+                  <a:extLst>
+                    <a:ext uri="{9D8B030D-6E8A-4147-A177-3AD203B41FA5}">
+                      <a16:colId xmlns:a16="http://schemas.microsoft.com/office/drawing/2014/main" val="2514631655"/>
+                    </a:ext>
+                  </a:extLst>
+                </a:gridCol>
+              </a:tblGrid>
+              <a:tr h="837128">
+                <a:tc>
+                  <a:txBody>
+                    <a:bodyPr/>
+                    <a:lstStyle/>
+                    <a:p>
+                      <a:pPr algn="ctr"/>
+                      <a:r>
+                        <a:rPr lang="en-US" sz="2800" b="1" dirty="0"/>
+                        <a:t>Model</a:t>
+                      </a:r>
+                    </a:p>
+                  </a:txBody>
+                  <a:tcPr anchor="ctr"/>
+                </a:tc>
+                <a:tc>
+                  <a:txBody>
+                    <a:bodyPr/>
+                    <a:lstStyle/>
+                    <a:p>
+                      <a:pPr algn="ctr"/>
+                      <a:r>
+                        <a:rPr lang="en-US" sz="2800" b="1" dirty="0"/>
+                        <a:t>Hypothesis</a:t>
+                      </a:r>
+                    </a:p>
+                  </a:txBody>
+                  <a:tcPr anchor="ctr"/>
+                </a:tc>
+                <a:extLst>
+                  <a:ext uri="{0D108BD9-81ED-4DB2-BD59-A6C34878D82A}">
+                    <a16:rowId xmlns:a16="http://schemas.microsoft.com/office/drawing/2014/main" val="2371647749"/>
+                  </a:ext>
+                </a:extLst>
+              </a:tr>
+              <a:tr h="837128">
+                <a:tc>
+                  <a:txBody>
+                    <a:bodyPr/>
+                    <a:lstStyle/>
+                    <a:p>
+                      <a:pPr algn="ctr"/>
+                      <a:r>
+                        <a:rPr lang="en-US" sz="2800" dirty="0"/>
+                        <a:t>Beachgrass + noise level</a:t>
+                      </a:r>
+                    </a:p>
+                  </a:txBody>
+                  <a:tcPr anchor="ctr"/>
+                </a:tc>
+                <a:tc>
+                  <a:txBody>
+                    <a:bodyPr/>
+                    <a:lstStyle/>
+                    <a:p>
+                      <a:pPr algn="ctr"/>
+                      <a:r>
+                        <a:rPr lang="en-US" sz="2800" dirty="0"/>
+                        <a:t>Island mouse abundance depends on beachgrass density and ambient noise level, which influence survival and reproduction.</a:t>
+                      </a:r>
+                    </a:p>
+                  </a:txBody>
+                  <a:tcPr anchor="ctr"/>
+                </a:tc>
+                <a:extLst>
+                  <a:ext uri="{0D108BD9-81ED-4DB2-BD59-A6C34878D82A}">
+                    <a16:rowId xmlns:a16="http://schemas.microsoft.com/office/drawing/2014/main" val="3106373039"/>
+                  </a:ext>
+                </a:extLst>
+              </a:tr>
+              <a:tr h="837128">
+                <a:tc>
+                  <a:txBody>
+                    <a:bodyPr/>
+                    <a:lstStyle/>
+                    <a:p>
+                      <a:pPr algn="ctr"/>
+                      <a:r>
+                        <a:rPr lang="en-US" sz="2800" dirty="0"/>
+                        <a:t>Beachgrass + noise level + predators</a:t>
+                      </a:r>
+                    </a:p>
+                  </a:txBody>
+                  <a:tcPr anchor="ctr"/>
+                </a:tc>
+                <a:tc>
+                  <a:txBody>
+                    <a:bodyPr/>
+                    <a:lstStyle/>
+                    <a:p>
+                      <a:pPr algn="ctr"/>
+                      <a:r>
+                        <a:rPr lang="en-US" sz="2800" dirty="0"/>
+                        <a:t>Island mouse abundance depends on beachgrass density, noise level, and whether predators are present.</a:t>
+                      </a:r>
+                    </a:p>
+                  </a:txBody>
+                  <a:tcPr anchor="ctr"/>
+                </a:tc>
+                <a:extLst>
+                  <a:ext uri="{0D108BD9-81ED-4DB2-BD59-A6C34878D82A}">
+                    <a16:rowId xmlns:a16="http://schemas.microsoft.com/office/drawing/2014/main" val="1149753690"/>
+                  </a:ext>
+                </a:extLst>
+              </a:tr>
+              <a:tr h="837128">
+                <a:tc>
+                  <a:txBody>
+                    <a:bodyPr/>
+                    <a:lstStyle/>
+                    <a:p>
+                      <a:pPr algn="ctr"/>
+                      <a:r>
+                        <a:rPr lang="en-US" sz="2800" dirty="0"/>
+                        <a:t>Beachgrass</a:t>
+                      </a:r>
+                    </a:p>
+                  </a:txBody>
+                  <a:tcPr anchor="ctr"/>
+                </a:tc>
+                <a:tc>
+                  <a:txBody>
+                    <a:bodyPr/>
+                    <a:lstStyle/>
+                    <a:p>
+                      <a:pPr algn="ctr"/>
+                      <a:r>
+                        <a:rPr lang="en-US" sz="2800" dirty="0"/>
+                        <a:t>Beachgrass density is the single best predictor of island mouse abundance. </a:t>
+                      </a:r>
+                    </a:p>
+                  </a:txBody>
+                  <a:tcPr anchor="ctr"/>
+                </a:tc>
+                <a:extLst>
+                  <a:ext uri="{0D108BD9-81ED-4DB2-BD59-A6C34878D82A}">
+                    <a16:rowId xmlns:a16="http://schemas.microsoft.com/office/drawing/2014/main" val="1502320386"/>
+                  </a:ext>
+                </a:extLst>
+              </a:tr>
+              <a:tr h="837128">
+                <a:tc>
+                  <a:txBody>
+                    <a:bodyPr/>
+                    <a:lstStyle/>
+                    <a:p>
+                      <a:pPr algn="ctr"/>
+                      <a:r>
+                        <a:rPr lang="en-US" sz="2800" dirty="0"/>
+                        <a:t>(.)</a:t>
+                      </a:r>
+                    </a:p>
+                  </a:txBody>
+                  <a:tcPr anchor="ctr"/>
+                </a:tc>
+                <a:tc>
+                  <a:txBody>
+                    <a:bodyPr/>
+                    <a:lstStyle/>
+                    <a:p>
+                      <a:pPr algn="ctr"/>
+                      <a:r>
+                        <a:rPr lang="en-US" sz="2800" dirty="0"/>
+                        <a:t>None of the above are strong predictors of abundance.</a:t>
+                      </a:r>
+                    </a:p>
+                  </a:txBody>
+                  <a:tcPr anchor="ctr"/>
+                </a:tc>
+                <a:extLst>
+                  <a:ext uri="{0D108BD9-81ED-4DB2-BD59-A6C34878D82A}">
+                    <a16:rowId xmlns:a16="http://schemas.microsoft.com/office/drawing/2014/main" val="3918891694"/>
+                  </a:ext>
+                </a:extLst>
+              </a:tr>
+            </a:tbl>
+          </a:graphicData>
+        </a:graphic>
+      </p:graphicFrame>
+    </p:spTree>
+    <p:extLst>
+      <p:ext uri="{BB962C8B-B14F-4D97-AF65-F5344CB8AC3E}">
+        <p14:creationId xmlns:p14="http://schemas.microsoft.com/office/powerpoint/2010/main" val="1984223754"/>
+      </p:ext>
+    </p:extLst>
+  </p:cSld>
+  <p:clrMapOvr>
+    <a:masterClrMapping/>
+  </p:clrMapOvr>
+</p:sld>
+</file>
+
+<file path=ppt/slides/slide11.xml><?xml version="1.0" encoding="utf-8"?>
+<p:sld xmlns:a="http://schemas.openxmlformats.org/drawingml/2006/main" xmlns:r="http://schemas.openxmlformats.org/officeDocument/2006/relationships" xmlns:p="http://schemas.openxmlformats.org/presentationml/2006/main">
+  <p:cSld>
+    <p:spTree>
+      <p:nvGrpSpPr>
+        <p:cNvPr id="1" name=""/>
+        <p:cNvGrpSpPr/>
+        <p:nvPr/>
+      </p:nvGrpSpPr>
+      <p:grpSpPr>
+        <a:xfrm>
+          <a:off x="0" y="0"/>
+          <a:ext cx="0" cy="0"/>
+          <a:chOff x="0" y="0"/>
+          <a:chExt cx="0" cy="0"/>
+        </a:xfrm>
+      </p:grpSpPr>
+      <p:sp>
+        <p:nvSpPr>
+          <p:cNvPr id="2" name="Title 1">
+            <a:extLst>
+              <a:ext uri="{FF2B5EF4-FFF2-40B4-BE49-F238E27FC236}">
+                <a16:creationId xmlns:a16="http://schemas.microsoft.com/office/drawing/2014/main" id="{90926A7D-B5B6-4018-9344-315FD202195A}"/>
+              </a:ext>
+            </a:extLst>
+          </p:cNvPr>
+          <p:cNvSpPr>
+            <a:spLocks noGrp="1"/>
+          </p:cNvSpPr>
+          <p:nvPr>
+            <p:ph type="title"/>
+          </p:nvPr>
+        </p:nvSpPr>
+        <p:spPr/>
+        <p:txBody>
+          <a:bodyPr/>
+          <a:lstStyle/>
+          <a:p>
+            <a:r>
+              <a:rPr lang="en-US" dirty="0"/>
+              <a:t>Part 3 – Predictors of breeding output</a:t>
+            </a:r>
+          </a:p>
+        </p:txBody>
+      </p:sp>
+      <p:sp>
+        <p:nvSpPr>
+          <p:cNvPr id="3" name="Content Placeholder 2">
+            <a:extLst>
+              <a:ext uri="{FF2B5EF4-FFF2-40B4-BE49-F238E27FC236}">
+                <a16:creationId xmlns:a16="http://schemas.microsoft.com/office/drawing/2014/main" id="{E771B1A9-C997-4B93-BB70-2F9D17FCF6E4}"/>
+              </a:ext>
+            </a:extLst>
+          </p:cNvPr>
+          <p:cNvSpPr>
+            <a:spLocks noGrp="1"/>
+          </p:cNvSpPr>
+          <p:nvPr>
+            <p:ph idx="1"/>
+          </p:nvPr>
+        </p:nvSpPr>
+        <p:spPr/>
+        <p:txBody>
+          <a:bodyPr>
+            <a:normAutofit lnSpcReduction="10000"/>
+          </a:bodyPr>
+          <a:lstStyle/>
+          <a:p>
+            <a:r>
+              <a:rPr lang="en-US" dirty="0"/>
+              <a:t>Modeling approach: Poisson GLM to estimate the number of offspring per female</a:t>
+            </a:r>
+          </a:p>
+          <a:p>
+            <a:r>
+              <a:rPr lang="en-US" dirty="0"/>
+              <a:t>Using the data sources listed in your handout, develop a set of candidate models to predict breeding output of Island mice</a:t>
+            </a:r>
+          </a:p>
+          <a:p>
+            <a:pPr lvl="1"/>
+            <a:r>
+              <a:rPr lang="en-US" dirty="0"/>
+              <a:t>Carefully consider the data sources available and how they may or may not be useful! </a:t>
+            </a:r>
+          </a:p>
+          <a:p>
+            <a:pPr lvl="1"/>
+            <a:r>
+              <a:rPr lang="en-US" dirty="0"/>
+              <a:t>You have different data sources available than with the previous exercises</a:t>
+            </a:r>
+          </a:p>
+          <a:p>
+            <a:r>
+              <a:rPr lang="en-US" b="1" i="1" dirty="0"/>
+              <a:t>Response variable = number of offspring per female</a:t>
+            </a:r>
+          </a:p>
+          <a:p>
+            <a:endParaRPr lang="en-US" i="1" dirty="0"/>
+          </a:p>
+          <a:p>
+            <a:r>
+              <a:rPr lang="en-US" b="1" dirty="0"/>
+              <a:t>Working alone or with your neighbors, develop a list of up to six possible candidate models</a:t>
+            </a:r>
+          </a:p>
+          <a:p>
+            <a:endParaRPr lang="en-US" dirty="0"/>
+          </a:p>
+        </p:txBody>
+      </p:sp>
+    </p:spTree>
+    <p:extLst>
+      <p:ext uri="{BB962C8B-B14F-4D97-AF65-F5344CB8AC3E}">
+        <p14:creationId xmlns:p14="http://schemas.microsoft.com/office/powerpoint/2010/main" val="33186973"/>
+      </p:ext>
+    </p:extLst>
+  </p:cSld>
+  <p:clrMapOvr>
+    <a:masterClrMapping/>
+  </p:clrMapOvr>
+</p:sld>
+</file>
+
+<file path=ppt/slides/slide12.xml><?xml version="1.0" encoding="utf-8"?>
+<p:sld xmlns:a="http://schemas.openxmlformats.org/drawingml/2006/main" xmlns:r="http://schemas.openxmlformats.org/officeDocument/2006/relationships" xmlns:p="http://schemas.openxmlformats.org/presentationml/2006/main">
+  <p:cSld>
+    <p:spTree>
+      <p:nvGrpSpPr>
+        <p:cNvPr id="1" name=""/>
+        <p:cNvGrpSpPr/>
+        <p:nvPr/>
+      </p:nvGrpSpPr>
+      <p:grpSpPr>
+        <a:xfrm>
+          <a:off x="0" y="0"/>
+          <a:ext cx="0" cy="0"/>
+          <a:chOff x="0" y="0"/>
+          <a:chExt cx="0" cy="0"/>
+        </a:xfrm>
+      </p:grpSpPr>
+      <p:graphicFrame>
+        <p:nvGraphicFramePr>
+          <p:cNvPr id="4" name="Table 3">
+            <a:extLst>
+              <a:ext uri="{FF2B5EF4-FFF2-40B4-BE49-F238E27FC236}">
+                <a16:creationId xmlns:a16="http://schemas.microsoft.com/office/drawing/2014/main" id="{6343D222-0039-47CD-9DD7-CCF6A72D21AB}"/>
+              </a:ext>
+            </a:extLst>
+          </p:cNvPr>
+          <p:cNvGraphicFramePr>
+            <a:graphicFrameLocks noGrp="1"/>
+          </p:cNvGraphicFramePr>
+          <p:nvPr>
+            <p:extLst>
+              <p:ext uri="{D42A27DB-BD31-4B8C-83A1-F6EECF244321}">
+                <p14:modId xmlns:p14="http://schemas.microsoft.com/office/powerpoint/2010/main" val="35061852"/>
+              </p:ext>
+            </p:extLst>
+          </p:nvPr>
+        </p:nvGraphicFramePr>
+        <p:xfrm>
+          <a:off x="414528" y="73490"/>
+          <a:ext cx="11375136" cy="5896808"/>
+        </p:xfrm>
+        <a:graphic>
+          <a:graphicData uri="http://schemas.openxmlformats.org/drawingml/2006/table">
+            <a:tbl>
+              <a:tblPr firstRow="1" bandRow="1">
+                <a:tableStyleId>{5940675A-B579-460E-94D1-54222C63F5DA}</a:tableStyleId>
+              </a:tblPr>
+              <a:tblGrid>
+                <a:gridCol w="5687568">
+                  <a:extLst>
+                    <a:ext uri="{9D8B030D-6E8A-4147-A177-3AD203B41FA5}">
+                      <a16:colId xmlns:a16="http://schemas.microsoft.com/office/drawing/2014/main" val="417726302"/>
+                    </a:ext>
+                  </a:extLst>
+                </a:gridCol>
+                <a:gridCol w="5687568">
+                  <a:extLst>
+                    <a:ext uri="{9D8B030D-6E8A-4147-A177-3AD203B41FA5}">
+                      <a16:colId xmlns:a16="http://schemas.microsoft.com/office/drawing/2014/main" val="2514631655"/>
+                    </a:ext>
+                  </a:extLst>
+                </a:gridCol>
+              </a:tblGrid>
+              <a:tr h="837128">
+                <a:tc>
+                  <a:txBody>
+                    <a:bodyPr/>
+                    <a:lstStyle/>
+                    <a:p>
+                      <a:pPr algn="ctr"/>
+                      <a:r>
+                        <a:rPr lang="en-US" sz="2800" b="1" dirty="0"/>
+                        <a:t>Model</a:t>
+                      </a:r>
+                    </a:p>
+                  </a:txBody>
+                  <a:tcPr anchor="ctr"/>
+                </a:tc>
+                <a:tc>
+                  <a:txBody>
+                    <a:bodyPr/>
+                    <a:lstStyle/>
+                    <a:p>
+                      <a:pPr algn="ctr"/>
+                      <a:r>
+                        <a:rPr lang="en-US" sz="2800" b="1" dirty="0"/>
+                        <a:t>Hypothesis</a:t>
+                      </a:r>
+                    </a:p>
+                  </a:txBody>
+                  <a:tcPr anchor="ctr"/>
+                </a:tc>
+                <a:extLst>
+                  <a:ext uri="{0D108BD9-81ED-4DB2-BD59-A6C34878D82A}">
+                    <a16:rowId xmlns:a16="http://schemas.microsoft.com/office/drawing/2014/main" val="2371647749"/>
+                  </a:ext>
+                </a:extLst>
+              </a:tr>
+              <a:tr h="837128">
+                <a:tc>
+                  <a:txBody>
+                    <a:bodyPr/>
+                    <a:lstStyle/>
+                    <a:p>
+                      <a:pPr algn="ctr"/>
+                      <a:r>
+                        <a:rPr lang="en-US" sz="2800" dirty="0"/>
+                        <a:t>Average air temp. + dune beetles</a:t>
+                      </a:r>
+                    </a:p>
+                  </a:txBody>
+                  <a:tcPr anchor="ctr"/>
+                </a:tc>
+                <a:tc>
+                  <a:txBody>
+                    <a:bodyPr/>
+                    <a:lstStyle/>
+                    <a:p>
+                      <a:pPr algn="ctr"/>
+                      <a:r>
+                        <a:rPr lang="en-US" sz="2800" dirty="0"/>
+                        <a:t>Island mouse breeding output depends on warm temperatures and high dune beetle abundance.</a:t>
+                      </a:r>
+                    </a:p>
+                  </a:txBody>
+                  <a:tcPr anchor="ctr"/>
+                </a:tc>
+                <a:extLst>
+                  <a:ext uri="{0D108BD9-81ED-4DB2-BD59-A6C34878D82A}">
+                    <a16:rowId xmlns:a16="http://schemas.microsoft.com/office/drawing/2014/main" val="3106373039"/>
+                  </a:ext>
+                </a:extLst>
+              </a:tr>
+              <a:tr h="837128">
+                <a:tc>
+                  <a:txBody>
+                    <a:bodyPr/>
+                    <a:lstStyle/>
+                    <a:p>
+                      <a:pPr algn="ctr"/>
+                      <a:r>
+                        <a:rPr lang="en-US" sz="2800" dirty="0"/>
+                        <a:t>Average air temp. + dune beetles + female age</a:t>
+                      </a:r>
+                    </a:p>
+                  </a:txBody>
+                  <a:tcPr anchor="ctr"/>
+                </a:tc>
+                <a:tc>
+                  <a:txBody>
+                    <a:bodyPr/>
+                    <a:lstStyle/>
+                    <a:p>
+                      <a:pPr algn="ctr"/>
+                      <a:r>
+                        <a:rPr lang="en-US" sz="2800" dirty="0"/>
+                        <a:t>Island mouse breeding output depends on temperature and dune beetle abundance, but older females have smaller litters.</a:t>
+                      </a:r>
+                    </a:p>
+                  </a:txBody>
+                  <a:tcPr anchor="ctr"/>
+                </a:tc>
+                <a:extLst>
+                  <a:ext uri="{0D108BD9-81ED-4DB2-BD59-A6C34878D82A}">
+                    <a16:rowId xmlns:a16="http://schemas.microsoft.com/office/drawing/2014/main" val="1149753690"/>
+                  </a:ext>
+                </a:extLst>
+              </a:tr>
+              <a:tr h="837128">
+                <a:tc>
+                  <a:txBody>
+                    <a:bodyPr/>
+                    <a:lstStyle/>
+                    <a:p>
+                      <a:pPr algn="ctr"/>
+                      <a:r>
+                        <a:rPr lang="en-US" sz="2800" dirty="0"/>
+                        <a:t>Dune beetles</a:t>
+                      </a:r>
+                    </a:p>
+                  </a:txBody>
+                  <a:tcPr anchor="ctr"/>
+                </a:tc>
+                <a:tc>
+                  <a:txBody>
+                    <a:bodyPr/>
+                    <a:lstStyle/>
+                    <a:p>
+                      <a:pPr algn="ctr"/>
+                      <a:r>
+                        <a:rPr lang="en-US" sz="2800" dirty="0"/>
+                        <a:t>Dune beetle abundance is the single best predictor of breeding output.</a:t>
+                      </a:r>
+                    </a:p>
+                  </a:txBody>
+                  <a:tcPr anchor="ctr"/>
+                </a:tc>
+                <a:extLst>
+                  <a:ext uri="{0D108BD9-81ED-4DB2-BD59-A6C34878D82A}">
+                    <a16:rowId xmlns:a16="http://schemas.microsoft.com/office/drawing/2014/main" val="1502320386"/>
+                  </a:ext>
+                </a:extLst>
+              </a:tr>
+              <a:tr h="837128">
+                <a:tc>
+                  <a:txBody>
+                    <a:bodyPr/>
+                    <a:lstStyle/>
+                    <a:p>
+                      <a:pPr algn="ctr"/>
+                      <a:r>
+                        <a:rPr lang="en-US" sz="2800" dirty="0"/>
+                        <a:t>(.)</a:t>
+                      </a:r>
+                    </a:p>
+                  </a:txBody>
+                  <a:tcPr anchor="ctr"/>
+                </a:tc>
+                <a:tc>
+                  <a:txBody>
+                    <a:bodyPr/>
+                    <a:lstStyle/>
+                    <a:p>
+                      <a:pPr algn="ctr"/>
+                      <a:r>
+                        <a:rPr lang="en-US" sz="2800" dirty="0"/>
+                        <a:t>None of the above are strong predictors of breeding output.</a:t>
+                      </a:r>
+                    </a:p>
+                  </a:txBody>
+                  <a:tcPr anchor="ctr"/>
+                </a:tc>
+                <a:extLst>
+                  <a:ext uri="{0D108BD9-81ED-4DB2-BD59-A6C34878D82A}">
+                    <a16:rowId xmlns:a16="http://schemas.microsoft.com/office/drawing/2014/main" val="3918891694"/>
+                  </a:ext>
+                </a:extLst>
+              </a:tr>
+            </a:tbl>
+          </a:graphicData>
+        </a:graphic>
+      </p:graphicFrame>
+    </p:spTree>
+    <p:extLst>
+      <p:ext uri="{BB962C8B-B14F-4D97-AF65-F5344CB8AC3E}">
+        <p14:creationId xmlns:p14="http://schemas.microsoft.com/office/powerpoint/2010/main" val="1587109430"/>
+      </p:ext>
+    </p:extLst>
+  </p:cSld>
+  <p:clrMapOvr>
+    <a:masterClrMapping/>
+  </p:clrMapOvr>
+</p:sld>
+</file>
+
+<file path=ppt/slides/slide13.xml><?xml version="1.0" encoding="utf-8"?>
+<p:sld xmlns:a="http://schemas.openxmlformats.org/drawingml/2006/main" xmlns:r="http://schemas.openxmlformats.org/officeDocument/2006/relationships" xmlns:p="http://schemas.openxmlformats.org/presentationml/2006/main">
+  <p:cSld>
+    <p:spTree>
+      <p:nvGrpSpPr>
+        <p:cNvPr id="1" name=""/>
+        <p:cNvGrpSpPr/>
+        <p:nvPr/>
+      </p:nvGrpSpPr>
+      <p:grpSpPr>
+        <a:xfrm>
+          <a:off x="0" y="0"/>
+          <a:ext cx="0" cy="0"/>
+          <a:chOff x="0" y="0"/>
+          <a:chExt cx="0" cy="0"/>
+        </a:xfrm>
+      </p:grpSpPr>
+      <p:sp>
+        <p:nvSpPr>
+          <p:cNvPr id="2" name="Title 1">
+            <a:extLst>
+              <a:ext uri="{FF2B5EF4-FFF2-40B4-BE49-F238E27FC236}">
+                <a16:creationId xmlns:a16="http://schemas.microsoft.com/office/drawing/2014/main" id="{BE3BB698-6FAB-435A-AD40-61F72D2C8CE4}"/>
+              </a:ext>
+            </a:extLst>
+          </p:cNvPr>
+          <p:cNvSpPr>
+            <a:spLocks noGrp="1"/>
+          </p:cNvSpPr>
+          <p:nvPr>
+            <p:ph type="title"/>
+          </p:nvPr>
+        </p:nvSpPr>
+        <p:spPr/>
+        <p:txBody>
+          <a:bodyPr/>
+          <a:lstStyle/>
+          <a:p>
+            <a:r>
+              <a:rPr lang="en-US" dirty="0"/>
+              <a:t>Review and recap</a:t>
+            </a:r>
+          </a:p>
+        </p:txBody>
+      </p:sp>
+      <p:sp>
+        <p:nvSpPr>
+          <p:cNvPr id="3" name="Content Placeholder 2">
+            <a:extLst>
+              <a:ext uri="{FF2B5EF4-FFF2-40B4-BE49-F238E27FC236}">
+                <a16:creationId xmlns:a16="http://schemas.microsoft.com/office/drawing/2014/main" id="{93902077-3A9B-4840-A9B7-E3CF23493B30}"/>
+              </a:ext>
+            </a:extLst>
+          </p:cNvPr>
+          <p:cNvSpPr>
+            <a:spLocks noGrp="1"/>
+          </p:cNvSpPr>
+          <p:nvPr>
+            <p:ph idx="1"/>
+          </p:nvPr>
+        </p:nvSpPr>
+        <p:spPr/>
+        <p:txBody>
+          <a:bodyPr/>
+          <a:lstStyle/>
+          <a:p>
+            <a:r>
+              <a:rPr lang="en-US" dirty="0"/>
+              <a:t>How similar or different were your model sets for occurrence, abundance, and breeding success?</a:t>
+            </a:r>
+          </a:p>
+          <a:p>
+            <a:endParaRPr lang="en-US" dirty="0"/>
+          </a:p>
+          <a:p>
+            <a:r>
+              <a:rPr lang="en-US" dirty="0"/>
+              <a:t>Were you able to capture all important ecological relationships with the data available? If not, how did you deal with it?</a:t>
+            </a:r>
+          </a:p>
+          <a:p>
+            <a:endParaRPr lang="en-US" dirty="0"/>
+          </a:p>
+          <a:p>
+            <a:pPr marL="0" indent="0">
+              <a:buNone/>
+            </a:pPr>
+            <a:endParaRPr lang="en-US" dirty="0"/>
+          </a:p>
+          <a:p>
+            <a:endParaRPr lang="en-US" dirty="0"/>
+          </a:p>
+        </p:txBody>
+      </p:sp>
+    </p:spTree>
+    <p:extLst>
+      <p:ext uri="{BB962C8B-B14F-4D97-AF65-F5344CB8AC3E}">
+        <p14:creationId xmlns:p14="http://schemas.microsoft.com/office/powerpoint/2010/main" val="1663716218"/>
       </p:ext>
     </p:extLst>
   </p:cSld>
@@ -9539,7 +10287,7 @@
           </a:p>
           <a:p>
             <a:r>
-              <a:rPr lang="en-US" i="1" dirty="0"/>
+              <a:rPr lang="en-US" b="1" i="1" dirty="0"/>
               <a:t>Response variable = probability of occurrence</a:t>
             </a:r>
           </a:p>
@@ -9836,6 +10584,132 @@
     <p:extLst>
       <p:ext uri="{BB962C8B-B14F-4D97-AF65-F5344CB8AC3E}">
         <p14:creationId xmlns:p14="http://schemas.microsoft.com/office/powerpoint/2010/main" val="3037972560"/>
+      </p:ext>
+    </p:extLst>
+  </p:cSld>
+  <p:clrMapOvr>
+    <a:masterClrMapping/>
+  </p:clrMapOvr>
+</p:sld>
+</file>
+
+<file path=ppt/slides/slide9.xml><?xml version="1.0" encoding="utf-8"?>
+<p:sld xmlns:a="http://schemas.openxmlformats.org/drawingml/2006/main" xmlns:r="http://schemas.openxmlformats.org/officeDocument/2006/relationships" xmlns:p="http://schemas.openxmlformats.org/presentationml/2006/main">
+  <p:cSld>
+    <p:spTree>
+      <p:nvGrpSpPr>
+        <p:cNvPr id="1" name=""/>
+        <p:cNvGrpSpPr/>
+        <p:nvPr/>
+      </p:nvGrpSpPr>
+      <p:grpSpPr>
+        <a:xfrm>
+          <a:off x="0" y="0"/>
+          <a:ext cx="0" cy="0"/>
+          <a:chOff x="0" y="0"/>
+          <a:chExt cx="0" cy="0"/>
+        </a:xfrm>
+      </p:grpSpPr>
+      <p:sp>
+        <p:nvSpPr>
+          <p:cNvPr id="2" name="Title 1">
+            <a:extLst>
+              <a:ext uri="{FF2B5EF4-FFF2-40B4-BE49-F238E27FC236}">
+                <a16:creationId xmlns:a16="http://schemas.microsoft.com/office/drawing/2014/main" id="{90926A7D-B5B6-4018-9344-315FD202195A}"/>
+              </a:ext>
+            </a:extLst>
+          </p:cNvPr>
+          <p:cNvSpPr>
+            <a:spLocks noGrp="1"/>
+          </p:cNvSpPr>
+          <p:nvPr>
+            <p:ph type="title"/>
+          </p:nvPr>
+        </p:nvSpPr>
+        <p:spPr/>
+        <p:txBody>
+          <a:bodyPr/>
+          <a:lstStyle/>
+          <a:p>
+            <a:r>
+              <a:rPr lang="en-US" dirty="0"/>
+              <a:t>Part 2 – Predictors of mouse abundance</a:t>
+            </a:r>
+          </a:p>
+        </p:txBody>
+      </p:sp>
+      <p:sp>
+        <p:nvSpPr>
+          <p:cNvPr id="3" name="Content Placeholder 2">
+            <a:extLst>
+              <a:ext uri="{FF2B5EF4-FFF2-40B4-BE49-F238E27FC236}">
+                <a16:creationId xmlns:a16="http://schemas.microsoft.com/office/drawing/2014/main" id="{E771B1A9-C997-4B93-BB70-2F9D17FCF6E4}"/>
+              </a:ext>
+            </a:extLst>
+          </p:cNvPr>
+          <p:cNvSpPr>
+            <a:spLocks noGrp="1"/>
+          </p:cNvSpPr>
+          <p:nvPr>
+            <p:ph idx="1"/>
+          </p:nvPr>
+        </p:nvSpPr>
+        <p:spPr/>
+        <p:txBody>
+          <a:bodyPr>
+            <a:normAutofit lnSpcReduction="10000"/>
+          </a:bodyPr>
+          <a:lstStyle/>
+          <a:p>
+            <a:r>
+              <a:rPr lang="en-US" dirty="0"/>
+              <a:t>Modeling approach: N-mixture model to estimate abundance while accounting for imperfect detection</a:t>
+            </a:r>
+          </a:p>
+          <a:p>
+            <a:r>
+              <a:rPr lang="en-US" dirty="0"/>
+              <a:t>Using the data sources listed in your handout, develop a set of candidate models to predict abundance of Island mice</a:t>
+            </a:r>
+          </a:p>
+          <a:p>
+            <a:pPr lvl="1"/>
+            <a:r>
+              <a:rPr lang="en-US" dirty="0"/>
+              <a:t>Carefully consider the data sources available and how they may or may not be useful! </a:t>
+            </a:r>
+          </a:p>
+          <a:p>
+            <a:pPr lvl="1"/>
+            <a:r>
+              <a:rPr lang="en-US" dirty="0"/>
+              <a:t>You have different data sources available than with the previous exercise</a:t>
+            </a:r>
+          </a:p>
+          <a:p>
+            <a:r>
+              <a:rPr lang="en-US" b="1" i="1" dirty="0"/>
+              <a:t>Response variable = site abundance</a:t>
+            </a:r>
+          </a:p>
+          <a:p>
+            <a:endParaRPr lang="en-US" i="1" dirty="0"/>
+          </a:p>
+          <a:p>
+            <a:r>
+              <a:rPr lang="en-US" b="1" dirty="0"/>
+              <a:t>Working alone or with your neighbors, develop a list of up to six possible candidate models</a:t>
+            </a:r>
+          </a:p>
+          <a:p>
+            <a:endParaRPr lang="en-US" dirty="0"/>
+          </a:p>
+        </p:txBody>
+      </p:sp>
+    </p:spTree>
+    <p:extLst>
+      <p:ext uri="{BB962C8B-B14F-4D97-AF65-F5344CB8AC3E}">
+        <p14:creationId xmlns:p14="http://schemas.microsoft.com/office/powerpoint/2010/main" val="2960987501"/>
       </p:ext>
     </p:extLst>
   </p:cSld>

</xml_diff>